<commit_message>
fix: AboutControlPrivacyStatement file path
</commit_message>
<xml_diff>
--- a/Slides 2020/8. 코드 분석 1.pptx
+++ b/Slides 2020/8. 코드 분석 1.pptx
@@ -239,7 +239,7 @@
           <a:p>
             <a:fld id="{3A51E6CB-1B67-49CD-819C-CBD1F8F15839}" type="datetimeFigureOut">
               <a:rPr lang="ko-KR" altLang="en-US" smtClean="0"/>
-              <a:t>2020-10-30</a:t>
+              <a:t>2021-10-13</a:t>
             </a:fld>
             <a:endParaRPr lang="ko-KR" altLang="en-US"/>
           </a:p>
@@ -721,7 +721,7 @@
           <a:p>
             <a:fld id="{1EA80F27-E9B9-4A8E-9A59-01CCB3F43850}" type="datetime1">
               <a:rPr lang="ko-KR" altLang="en-US" smtClean="0"/>
-              <a:t>2020-10-30</a:t>
+              <a:t>2021-10-13</a:t>
             </a:fld>
             <a:endParaRPr lang="ko-KR" altLang="en-US"/>
           </a:p>
@@ -937,7 +937,7 @@
           <a:p>
             <a:fld id="{7E5363F8-22A8-407F-82B0-EFC1D1C22895}" type="datetime1">
               <a:rPr lang="ko-KR" altLang="en-US" smtClean="0"/>
-              <a:t>2020-10-30</a:t>
+              <a:t>2021-10-13</a:t>
             </a:fld>
             <a:endParaRPr lang="ko-KR" altLang="en-US"/>
           </a:p>
@@ -1117,7 +1117,7 @@
           <a:p>
             <a:fld id="{8187739B-8E74-4F06-BBD0-F6D670C1F7A1}" type="datetime1">
               <a:rPr lang="ko-KR" altLang="en-US" smtClean="0"/>
-              <a:t>2020-10-30</a:t>
+              <a:t>2021-10-13</a:t>
             </a:fld>
             <a:endParaRPr lang="ko-KR" altLang="en-US"/>
           </a:p>
@@ -1218,7 +1218,7 @@
           <a:p>
             <a:fld id="{170798F3-F6A9-4876-8D5A-30BE2843F4A2}" type="datetime1">
               <a:rPr lang="ko-KR" altLang="en-US" smtClean="0"/>
-              <a:t>2020-10-30</a:t>
+              <a:t>2021-10-13</a:t>
             </a:fld>
             <a:endParaRPr lang="ko-KR" altLang="en-US"/>
           </a:p>
@@ -1462,7 +1462,7 @@
           <a:p>
             <a:fld id="{947C39E4-F1C0-46F5-93CB-857C8C3AEB8D}" type="datetime1">
               <a:rPr lang="ko-KR" altLang="en-US" smtClean="0"/>
-              <a:t>2020-10-30</a:t>
+              <a:t>2021-10-13</a:t>
             </a:fld>
             <a:endParaRPr lang="ko-KR" altLang="en-US"/>
           </a:p>
@@ -1706,7 +1706,7 @@
           <a:p>
             <a:fld id="{7818271D-E6C7-4286-B2FD-D9AA53F1E428}" type="datetime1">
               <a:rPr lang="ko-KR" altLang="en-US" smtClean="0"/>
-              <a:t>2020-10-30</a:t>
+              <a:t>2021-10-13</a:t>
             </a:fld>
             <a:endParaRPr lang="ko-KR" altLang="en-US"/>
           </a:p>
@@ -1938,7 +1938,7 @@
           <a:p>
             <a:fld id="{8CE3C26B-F624-420D-BF9D-391E2E695B27}" type="datetime1">
               <a:rPr lang="ko-KR" altLang="en-US" smtClean="0"/>
-              <a:t>2020-10-30</a:t>
+              <a:t>2021-10-13</a:t>
             </a:fld>
             <a:endParaRPr lang="ko-KR" altLang="en-US"/>
           </a:p>
@@ -2305,7 +2305,7 @@
           <a:p>
             <a:fld id="{A1FC83CE-7AD5-4A20-9998-54C7F9F05545}" type="datetime1">
               <a:rPr lang="ko-KR" altLang="en-US" smtClean="0"/>
-              <a:t>2020-10-30</a:t>
+              <a:t>2021-10-13</a:t>
             </a:fld>
             <a:endParaRPr lang="ko-KR" altLang="en-US"/>
           </a:p>
@@ -2423,7 +2423,7 @@
           <a:p>
             <a:fld id="{3A3E22EA-EB96-4ADF-ABA9-A693E5F7BB1E}" type="datetime1">
               <a:rPr lang="ko-KR" altLang="en-US" smtClean="0"/>
-              <a:t>2020-10-30</a:t>
+              <a:t>2021-10-13</a:t>
             </a:fld>
             <a:endParaRPr lang="ko-KR" altLang="en-US"/>
           </a:p>
@@ -2518,7 +2518,7 @@
           <a:p>
             <a:fld id="{0D5BD961-86A8-440A-8C4E-52B6CA6FECED}" type="datetime1">
               <a:rPr lang="ko-KR" altLang="en-US" smtClean="0"/>
-              <a:t>2020-10-30</a:t>
+              <a:t>2021-10-13</a:t>
             </a:fld>
             <a:endParaRPr lang="ko-KR" altLang="en-US"/>
           </a:p>
@@ -2795,7 +2795,7 @@
           <a:p>
             <a:fld id="{CD151CC0-1347-483B-8708-01772054FA68}" type="datetime1">
               <a:rPr lang="ko-KR" altLang="en-US" smtClean="0"/>
-              <a:t>2020-10-30</a:t>
+              <a:t>2021-10-13</a:t>
             </a:fld>
             <a:endParaRPr lang="ko-KR" altLang="en-US"/>
           </a:p>
@@ -3052,7 +3052,7 @@
           <a:p>
             <a:fld id="{57185993-49E6-4096-BF26-930E741DA796}" type="datetime1">
               <a:rPr lang="ko-KR" altLang="en-US" smtClean="0"/>
-              <a:t>2020-10-30</a:t>
+              <a:t>2021-10-13</a:t>
             </a:fld>
             <a:endParaRPr lang="ko-KR" altLang="en-US"/>
           </a:p>
@@ -3268,7 +3268,7 @@
           <a:p>
             <a:fld id="{170798F3-F6A9-4876-8D5A-30BE2843F4A2}" type="datetime1">
               <a:rPr lang="ko-KR" altLang="en-US" smtClean="0"/>
-              <a:t>2020-10-30</a:t>
+              <a:t>2021-10-13</a:t>
             </a:fld>
             <a:endParaRPr lang="ko-KR" altLang="en-US"/>
           </a:p>
@@ -8975,10 +8975,10 @@
       </p:sp>
       <p:pic>
         <p:nvPicPr>
-          <p:cNvPr id="7" name="그림 6">
-            <a:extLst>
-              <a:ext uri="{FF2B5EF4-FFF2-40B4-BE49-F238E27FC236}">
-                <a16:creationId xmlns:a16="http://schemas.microsoft.com/office/drawing/2014/main" id="{B255F994-0CBF-4EE2-BD94-A7A0EEC39477}"/>
+          <p:cNvPr id="6" name="그림 5">
+            <a:extLst>
+              <a:ext uri="{FF2B5EF4-FFF2-40B4-BE49-F238E27FC236}">
+                <a16:creationId xmlns:a16="http://schemas.microsoft.com/office/drawing/2014/main" id="{F481B1CF-C041-4EE7-8061-617EBD83A416}"/>
               </a:ext>
             </a:extLst>
           </p:cNvPr>
@@ -8995,8 +8995,38 @@
         </p:blipFill>
         <p:spPr>
           <a:xfrm>
-            <a:off x="1790700" y="2288025"/>
-            <a:ext cx="5562600" cy="4161000"/>
+            <a:off x="1319432" y="2497821"/>
+            <a:ext cx="3352446" cy="3641914"/>
+          </a:xfrm>
+          <a:prstGeom prst="rect">
+            <a:avLst/>
+          </a:prstGeom>
+        </p:spPr>
+      </p:pic>
+      <p:pic>
+        <p:nvPicPr>
+          <p:cNvPr id="9" name="그림 8">
+            <a:extLst>
+              <a:ext uri="{FF2B5EF4-FFF2-40B4-BE49-F238E27FC236}">
+                <a16:creationId xmlns:a16="http://schemas.microsoft.com/office/drawing/2014/main" id="{641444E2-D349-44FB-8B48-C1AA2480DB6C}"/>
+              </a:ext>
+            </a:extLst>
+          </p:cNvPr>
+          <p:cNvPicPr>
+            <a:picLocks noChangeAspect="1"/>
+          </p:cNvPicPr>
+          <p:nvPr/>
+        </p:nvPicPr>
+        <p:blipFill>
+          <a:blip r:embed="rId3"/>
+          <a:stretch>
+            <a:fillRect/>
+          </a:stretch>
+        </p:blipFill>
+        <p:spPr>
+          <a:xfrm>
+            <a:off x="4671878" y="2497821"/>
+            <a:ext cx="3326103" cy="3641914"/>
           </a:xfrm>
           <a:prstGeom prst="rect">
             <a:avLst/>
@@ -9829,21 +9859,73 @@
           </a:p>
         </p:txBody>
       </p:sp>
+      <p:sp>
+        <p:nvSpPr>
+          <p:cNvPr id="4" name="슬라이드 번호 개체 틀 3">
+            <a:extLst>
+              <a:ext uri="{FF2B5EF4-FFF2-40B4-BE49-F238E27FC236}">
+                <a16:creationId xmlns:a16="http://schemas.microsoft.com/office/drawing/2014/main" id="{AA5567AC-A1CD-4059-B50C-57C887B0880E}"/>
+              </a:ext>
+            </a:extLst>
+          </p:cNvPr>
+          <p:cNvSpPr>
+            <a:spLocks noGrp="1"/>
+          </p:cNvSpPr>
+          <p:nvPr>
+            <p:ph type="sldNum" sz="quarter" idx="12"/>
+          </p:nvPr>
+        </p:nvSpPr>
+        <p:spPr/>
+        <p:txBody>
+          <a:bodyPr/>
+          <a:lstStyle/>
+          <a:p>
+            <a:fld id="{64F0D409-D3F6-4EEC-8C77-1F5E89989FFB}" type="slidenum">
+              <a:rPr lang="ko-KR" altLang="en-US" smtClean="0"/>
+              <a:t>41</a:t>
+            </a:fld>
+            <a:endParaRPr lang="ko-KR" altLang="en-US"/>
+          </a:p>
+        </p:txBody>
+      </p:sp>
+      <p:sp>
+        <p:nvSpPr>
+          <p:cNvPr id="6" name="내용 개체 틀 5">
+            <a:extLst>
+              <a:ext uri="{FF2B5EF4-FFF2-40B4-BE49-F238E27FC236}">
+                <a16:creationId xmlns:a16="http://schemas.microsoft.com/office/drawing/2014/main" id="{877E876C-1A4E-464C-883E-FE8C6E8F0D73}"/>
+              </a:ext>
+            </a:extLst>
+          </p:cNvPr>
+          <p:cNvSpPr>
+            <a:spLocks noGrp="1"/>
+          </p:cNvSpPr>
+          <p:nvPr>
+            <p:ph idx="1"/>
+          </p:nvPr>
+        </p:nvSpPr>
+        <p:spPr/>
+        <p:txBody>
+          <a:bodyPr/>
+          <a:lstStyle/>
+          <a:p>
+            <a:endParaRPr lang="ko-KR" altLang="en-US" dirty="0"/>
+          </a:p>
+        </p:txBody>
+      </p:sp>
       <p:pic>
         <p:nvPicPr>
-          <p:cNvPr id="5" name="내용 개체 틀 4">
-            <a:extLst>
-              <a:ext uri="{FF2B5EF4-FFF2-40B4-BE49-F238E27FC236}">
-                <a16:creationId xmlns:a16="http://schemas.microsoft.com/office/drawing/2014/main" id="{A3E156B7-2EAA-4EBE-8E38-1E21104801EC}"/>
+          <p:cNvPr id="10" name="그림 9">
+            <a:extLst>
+              <a:ext uri="{FF2B5EF4-FFF2-40B4-BE49-F238E27FC236}">
+                <a16:creationId xmlns:a16="http://schemas.microsoft.com/office/drawing/2014/main" id="{7E45CF0B-031B-4970-9C0B-F322008623B6}"/>
               </a:ext>
             </a:extLst>
           </p:cNvPr>
           <p:cNvPicPr>
-            <a:picLocks noGrp="1" noChangeAspect="1"/>
+            <a:picLocks noChangeAspect="1"/>
           </p:cNvPicPr>
-          <p:nvPr>
-            <p:ph idx="1"/>
-          </p:nvPr>
+          <p:nvPr/>
         </p:nvPicPr>
         <p:blipFill>
           <a:blip r:embed="rId2"/>
@@ -9853,43 +9935,14 @@
         </p:blipFill>
         <p:spPr>
           <a:xfrm>
-            <a:off x="395288" y="1162249"/>
-            <a:ext cx="8353425" cy="5062139"/>
+            <a:off x="566519" y="1058566"/>
+            <a:ext cx="8010961" cy="5609798"/>
           </a:xfrm>
           <a:prstGeom prst="rect">
             <a:avLst/>
           </a:prstGeom>
         </p:spPr>
       </p:pic>
-      <p:sp>
-        <p:nvSpPr>
-          <p:cNvPr id="4" name="슬라이드 번호 개체 틀 3">
-            <a:extLst>
-              <a:ext uri="{FF2B5EF4-FFF2-40B4-BE49-F238E27FC236}">
-                <a16:creationId xmlns:a16="http://schemas.microsoft.com/office/drawing/2014/main" id="{AA5567AC-A1CD-4059-B50C-57C887B0880E}"/>
-              </a:ext>
-            </a:extLst>
-          </p:cNvPr>
-          <p:cNvSpPr>
-            <a:spLocks noGrp="1"/>
-          </p:cNvSpPr>
-          <p:nvPr>
-            <p:ph type="sldNum" sz="quarter" idx="12"/>
-          </p:nvPr>
-        </p:nvSpPr>
-        <p:spPr/>
-        <p:txBody>
-          <a:bodyPr/>
-          <a:lstStyle/>
-          <a:p>
-            <a:fld id="{64F0D409-D3F6-4EEC-8C77-1F5E89989FFB}" type="slidenum">
-              <a:rPr lang="ko-KR" altLang="en-US" smtClean="0"/>
-              <a:t>41</a:t>
-            </a:fld>
-            <a:endParaRPr lang="ko-KR" altLang="en-US"/>
-          </a:p>
-        </p:txBody>
-      </p:sp>
     </p:spTree>
     <p:extLst>
       <p:ext uri="{BB962C8B-B14F-4D97-AF65-F5344CB8AC3E}">
@@ -9956,21 +10009,73 @@
           </a:p>
         </p:txBody>
       </p:sp>
+      <p:sp>
+        <p:nvSpPr>
+          <p:cNvPr id="4" name="슬라이드 번호 개체 틀 3">
+            <a:extLst>
+              <a:ext uri="{FF2B5EF4-FFF2-40B4-BE49-F238E27FC236}">
+                <a16:creationId xmlns:a16="http://schemas.microsoft.com/office/drawing/2014/main" id="{51D21045-41E3-44ED-8D0F-2D53A5CFBBC9}"/>
+              </a:ext>
+            </a:extLst>
+          </p:cNvPr>
+          <p:cNvSpPr>
+            <a:spLocks noGrp="1"/>
+          </p:cNvSpPr>
+          <p:nvPr>
+            <p:ph type="sldNum" sz="quarter" idx="12"/>
+          </p:nvPr>
+        </p:nvSpPr>
+        <p:spPr/>
+        <p:txBody>
+          <a:bodyPr/>
+          <a:lstStyle/>
+          <a:p>
+            <a:fld id="{64F0D409-D3F6-4EEC-8C77-1F5E89989FFB}" type="slidenum">
+              <a:rPr lang="ko-KR" altLang="en-US" smtClean="0"/>
+              <a:t>42</a:t>
+            </a:fld>
+            <a:endParaRPr lang="ko-KR" altLang="en-US"/>
+          </a:p>
+        </p:txBody>
+      </p:sp>
+      <p:sp>
+        <p:nvSpPr>
+          <p:cNvPr id="6" name="내용 개체 틀 5">
+            <a:extLst>
+              <a:ext uri="{FF2B5EF4-FFF2-40B4-BE49-F238E27FC236}">
+                <a16:creationId xmlns:a16="http://schemas.microsoft.com/office/drawing/2014/main" id="{FDC2E103-704B-4400-BE68-B609593B0C19}"/>
+              </a:ext>
+            </a:extLst>
+          </p:cNvPr>
+          <p:cNvSpPr>
+            <a:spLocks noGrp="1"/>
+          </p:cNvSpPr>
+          <p:nvPr>
+            <p:ph idx="1"/>
+          </p:nvPr>
+        </p:nvSpPr>
+        <p:spPr/>
+        <p:txBody>
+          <a:bodyPr/>
+          <a:lstStyle/>
+          <a:p>
+            <a:endParaRPr lang="ko-KR" altLang="en-US" dirty="0"/>
+          </a:p>
+        </p:txBody>
+      </p:sp>
       <p:pic>
         <p:nvPicPr>
-          <p:cNvPr id="5" name="내용 개체 틀 4">
-            <a:extLst>
-              <a:ext uri="{FF2B5EF4-FFF2-40B4-BE49-F238E27FC236}">
-                <a16:creationId xmlns:a16="http://schemas.microsoft.com/office/drawing/2014/main" id="{59A2F8CF-D086-4156-B590-38EF3F7F8F5A}"/>
+          <p:cNvPr id="8" name="그림 7">
+            <a:extLst>
+              <a:ext uri="{FF2B5EF4-FFF2-40B4-BE49-F238E27FC236}">
+                <a16:creationId xmlns:a16="http://schemas.microsoft.com/office/drawing/2014/main" id="{511E813C-3D6B-4D44-BA55-276812B18B45}"/>
               </a:ext>
             </a:extLst>
           </p:cNvPr>
           <p:cNvPicPr>
-            <a:picLocks noGrp="1" noChangeAspect="1"/>
+            <a:picLocks noChangeAspect="1"/>
           </p:cNvPicPr>
-          <p:nvPr>
-            <p:ph idx="1"/>
-          </p:nvPr>
+          <p:nvPr/>
         </p:nvPicPr>
         <p:blipFill>
           <a:blip r:embed="rId2"/>
@@ -9980,8 +10085,8 @@
         </p:blipFill>
         <p:spPr>
           <a:xfrm>
-            <a:off x="544364" y="1058863"/>
-            <a:ext cx="8055272" cy="5268912"/>
+            <a:off x="395536" y="896245"/>
+            <a:ext cx="8547288" cy="5096683"/>
           </a:xfrm>
           <a:prstGeom prst="rect">
             <a:avLst/>
@@ -9990,30 +10095,75 @@
       </p:pic>
       <p:sp>
         <p:nvSpPr>
-          <p:cNvPr id="4" name="슬라이드 번호 개체 틀 3">
-            <a:extLst>
-              <a:ext uri="{FF2B5EF4-FFF2-40B4-BE49-F238E27FC236}">
-                <a16:creationId xmlns:a16="http://schemas.microsoft.com/office/drawing/2014/main" id="{51D21045-41E3-44ED-8D0F-2D53A5CFBBC9}"/>
-              </a:ext>
-            </a:extLst>
-          </p:cNvPr>
-          <p:cNvSpPr>
-            <a:spLocks noGrp="1"/>
-          </p:cNvSpPr>
-          <p:nvPr>
-            <p:ph type="sldNum" sz="quarter" idx="12"/>
-          </p:nvPr>
-        </p:nvSpPr>
-        <p:spPr/>
-        <p:txBody>
-          <a:bodyPr/>
-          <a:lstStyle/>
-          <a:p>
-            <a:fld id="{64F0D409-D3F6-4EEC-8C77-1F5E89989FFB}" type="slidenum">
-              <a:rPr lang="ko-KR" altLang="en-US" smtClean="0"/>
-              <a:t>42</a:t>
-            </a:fld>
-            <a:endParaRPr lang="ko-KR" altLang="en-US"/>
+          <p:cNvPr id="10" name="TextBox 9">
+            <a:extLst>
+              <a:ext uri="{FF2B5EF4-FFF2-40B4-BE49-F238E27FC236}">
+                <a16:creationId xmlns:a16="http://schemas.microsoft.com/office/drawing/2014/main" id="{131F0763-3EE7-4D10-A727-04BDD796DD61}"/>
+              </a:ext>
+            </a:extLst>
+          </p:cNvPr>
+          <p:cNvSpPr txBox="1"/>
+          <p:nvPr/>
+        </p:nvSpPr>
+        <p:spPr>
+          <a:xfrm>
+            <a:off x="1761687" y="6181333"/>
+            <a:ext cx="6337883" cy="646331"/>
+          </a:xfrm>
+          <a:prstGeom prst="rect">
+            <a:avLst/>
+          </a:prstGeom>
+          <a:noFill/>
+        </p:spPr>
+        <p:txBody>
+          <a:bodyPr wrap="square">
+            <a:spAutoFit/>
+          </a:bodyPr>
+          <a:lstStyle/>
+          <a:p>
+            <a:r>
+              <a:rPr lang="ko-KR" altLang="en-US" sz="1800" dirty="0"/>
+              <a:t>주석 처리 </a:t>
+            </a:r>
+            <a:r>
+              <a:rPr lang="en-US" altLang="ko-KR" sz="1800" dirty="0"/>
+              <a:t>: (</a:t>
+            </a:r>
+            <a:r>
+              <a:rPr lang="ko-KR" altLang="en-US" dirty="0"/>
+              <a:t>주석 처리할 영역 선택 후</a:t>
+            </a:r>
+            <a:r>
+              <a:rPr lang="en-US" altLang="ko-KR" dirty="0"/>
+              <a:t>) </a:t>
+            </a:r>
+            <a:r>
+              <a:rPr lang="en-US" altLang="ko-KR" sz="1800" dirty="0"/>
+              <a:t>Ctrl + K + C</a:t>
+            </a:r>
+          </a:p>
+          <a:p>
+            <a:r>
+              <a:rPr lang="ko-KR" altLang="en-US" dirty="0"/>
+              <a:t>주석 해제 </a:t>
+            </a:r>
+            <a:r>
+              <a:rPr lang="en-US" altLang="ko-KR" dirty="0"/>
+              <a:t>: </a:t>
+            </a:r>
+            <a:r>
+              <a:rPr lang="en-US" altLang="ko-KR" sz="1800" dirty="0"/>
+              <a:t>(</a:t>
+            </a:r>
+            <a:r>
+              <a:rPr lang="ko-KR" altLang="en-US" dirty="0"/>
+              <a:t>주석 해제할 영역 선택 후</a:t>
+            </a:r>
+            <a:r>
+              <a:rPr lang="en-US" altLang="ko-KR" dirty="0"/>
+              <a:t>) Ctrl + K + U</a:t>
+            </a:r>
+            <a:endParaRPr lang="en-US" altLang="ko-KR" sz="1800" dirty="0"/>
           </a:p>
         </p:txBody>
       </p:sp>
@@ -10099,51 +10249,80 @@
             <p:ph idx="1"/>
           </p:nvPr>
         </p:nvPicPr>
+        <p:blipFill rotWithShape="1">
+          <a:blip r:embed="rId2"/>
+          <a:srcRect l="61318" b="-802"/>
+          <a:stretch/>
+        </p:blipFill>
+        <p:spPr>
+          <a:xfrm>
+            <a:off x="4528482" y="1505212"/>
+            <a:ext cx="3734674" cy="4440617"/>
+          </a:xfrm>
+          <a:prstGeom prst="rect">
+            <a:avLst/>
+          </a:prstGeom>
+        </p:spPr>
+      </p:pic>
+      <p:sp>
+        <p:nvSpPr>
+          <p:cNvPr id="4" name="슬라이드 번호 개체 틀 3">
+            <a:extLst>
+              <a:ext uri="{FF2B5EF4-FFF2-40B4-BE49-F238E27FC236}">
+                <a16:creationId xmlns:a16="http://schemas.microsoft.com/office/drawing/2014/main" id="{1C058902-D12A-45AA-B2D2-7F6438547C05}"/>
+              </a:ext>
+            </a:extLst>
+          </p:cNvPr>
+          <p:cNvSpPr>
+            <a:spLocks noGrp="1"/>
+          </p:cNvSpPr>
+          <p:nvPr>
+            <p:ph type="sldNum" sz="quarter" idx="12"/>
+          </p:nvPr>
+        </p:nvSpPr>
+        <p:spPr/>
+        <p:txBody>
+          <a:bodyPr/>
+          <a:lstStyle/>
+          <a:p>
+            <a:fld id="{64F0D409-D3F6-4EEC-8C77-1F5E89989FFB}" type="slidenum">
+              <a:rPr lang="ko-KR" altLang="en-US" smtClean="0"/>
+              <a:t>43</a:t>
+            </a:fld>
+            <a:endParaRPr lang="ko-KR" altLang="en-US"/>
+          </a:p>
+        </p:txBody>
+      </p:sp>
+      <p:pic>
+        <p:nvPicPr>
+          <p:cNvPr id="6" name="그림 5">
+            <a:extLst>
+              <a:ext uri="{FF2B5EF4-FFF2-40B4-BE49-F238E27FC236}">
+                <a16:creationId xmlns:a16="http://schemas.microsoft.com/office/drawing/2014/main" id="{87A156F1-4B65-4AD8-B204-A86192200D4E}"/>
+              </a:ext>
+            </a:extLst>
+          </p:cNvPr>
+          <p:cNvPicPr>
+            <a:picLocks noChangeAspect="1"/>
+          </p:cNvPicPr>
+          <p:nvPr/>
+        </p:nvPicPr>
         <p:blipFill>
-          <a:blip r:embed="rId2"/>
+          <a:blip r:embed="rId3"/>
           <a:stretch>
             <a:fillRect/>
           </a:stretch>
         </p:blipFill>
         <p:spPr>
           <a:xfrm>
-            <a:off x="89062" y="1647826"/>
-            <a:ext cx="8965878" cy="4090986"/>
+            <a:off x="705025" y="1505213"/>
+            <a:ext cx="3866975" cy="4383118"/>
           </a:xfrm>
           <a:prstGeom prst="rect">
             <a:avLst/>
           </a:prstGeom>
         </p:spPr>
       </p:pic>
-      <p:sp>
-        <p:nvSpPr>
-          <p:cNvPr id="4" name="슬라이드 번호 개체 틀 3">
-            <a:extLst>
-              <a:ext uri="{FF2B5EF4-FFF2-40B4-BE49-F238E27FC236}">
-                <a16:creationId xmlns:a16="http://schemas.microsoft.com/office/drawing/2014/main" id="{1C058902-D12A-45AA-B2D2-7F6438547C05}"/>
-              </a:ext>
-            </a:extLst>
-          </p:cNvPr>
-          <p:cNvSpPr>
-            <a:spLocks noGrp="1"/>
-          </p:cNvSpPr>
-          <p:nvPr>
-            <p:ph type="sldNum" sz="quarter" idx="12"/>
-          </p:nvPr>
-        </p:nvSpPr>
-        <p:spPr/>
-        <p:txBody>
-          <a:bodyPr/>
-          <a:lstStyle/>
-          <a:p>
-            <a:fld id="{64F0D409-D3F6-4EEC-8C77-1F5E89989FFB}" type="slidenum">
-              <a:rPr lang="ko-KR" altLang="en-US" smtClean="0"/>
-              <a:t>43</a:t>
-            </a:fld>
-            <a:endParaRPr lang="ko-KR" altLang="en-US"/>
-          </a:p>
-        </p:txBody>
-      </p:sp>
     </p:spTree>
     <p:extLst>
       <p:ext uri="{BB962C8B-B14F-4D97-AF65-F5344CB8AC3E}">

</xml_diff>